<commit_message>
pavlovia intro clean up
</commit_message>
<xml_diff>
--- a/artwork/artwork-editable.pptx
+++ b/artwork/artwork-editable.pptx
@@ -6,6 +6,10 @@
   </p:sldMasterIdLst>
   <p:sldIdLst>
     <p:sldId id="256" r:id="rId2"/>
+    <p:sldId id="258" r:id="rId3"/>
+    <p:sldId id="257" r:id="rId4"/>
+    <p:sldId id="259" r:id="rId5"/>
+    <p:sldId id="260" r:id="rId6"/>
   </p:sldIdLst>
   <p:sldSz cx="12192000" cy="6858000"/>
   <p:notesSz cx="6858000" cy="9144000"/>
@@ -261,7 +265,7 @@
           <a:p>
             <a:fld id="{429AF907-D2DD-471B-98E0-43B0AA376D69}" type="datetimeFigureOut">
               <a:rPr lang="en-GB" smtClean="0"/>
-              <a:t>13/05/2021</a:t>
+              <a:t>19/05/2021</a:t>
             </a:fld>
             <a:endParaRPr lang="en-GB"/>
           </a:p>
@@ -461,7 +465,7 @@
           <a:p>
             <a:fld id="{429AF907-D2DD-471B-98E0-43B0AA376D69}" type="datetimeFigureOut">
               <a:rPr lang="en-GB" smtClean="0"/>
-              <a:t>13/05/2021</a:t>
+              <a:t>19/05/2021</a:t>
             </a:fld>
             <a:endParaRPr lang="en-GB"/>
           </a:p>
@@ -671,7 +675,7 @@
           <a:p>
             <a:fld id="{429AF907-D2DD-471B-98E0-43B0AA376D69}" type="datetimeFigureOut">
               <a:rPr lang="en-GB" smtClean="0"/>
-              <a:t>13/05/2021</a:t>
+              <a:t>19/05/2021</a:t>
             </a:fld>
             <a:endParaRPr lang="en-GB"/>
           </a:p>
@@ -871,7 +875,7 @@
           <a:p>
             <a:fld id="{429AF907-D2DD-471B-98E0-43B0AA376D69}" type="datetimeFigureOut">
               <a:rPr lang="en-GB" smtClean="0"/>
-              <a:t>13/05/2021</a:t>
+              <a:t>19/05/2021</a:t>
             </a:fld>
             <a:endParaRPr lang="en-GB"/>
           </a:p>
@@ -1147,7 +1151,7 @@
           <a:p>
             <a:fld id="{429AF907-D2DD-471B-98E0-43B0AA376D69}" type="datetimeFigureOut">
               <a:rPr lang="en-GB" smtClean="0"/>
-              <a:t>13/05/2021</a:t>
+              <a:t>19/05/2021</a:t>
             </a:fld>
             <a:endParaRPr lang="en-GB"/>
           </a:p>
@@ -1415,7 +1419,7 @@
           <a:p>
             <a:fld id="{429AF907-D2DD-471B-98E0-43B0AA376D69}" type="datetimeFigureOut">
               <a:rPr lang="en-GB" smtClean="0"/>
-              <a:t>13/05/2021</a:t>
+              <a:t>19/05/2021</a:t>
             </a:fld>
             <a:endParaRPr lang="en-GB"/>
           </a:p>
@@ -1830,7 +1834,7 @@
           <a:p>
             <a:fld id="{429AF907-D2DD-471B-98E0-43B0AA376D69}" type="datetimeFigureOut">
               <a:rPr lang="en-GB" smtClean="0"/>
-              <a:t>13/05/2021</a:t>
+              <a:t>19/05/2021</a:t>
             </a:fld>
             <a:endParaRPr lang="en-GB"/>
           </a:p>
@@ -1972,7 +1976,7 @@
           <a:p>
             <a:fld id="{429AF907-D2DD-471B-98E0-43B0AA376D69}" type="datetimeFigureOut">
               <a:rPr lang="en-GB" smtClean="0"/>
-              <a:t>13/05/2021</a:t>
+              <a:t>19/05/2021</a:t>
             </a:fld>
             <a:endParaRPr lang="en-GB"/>
           </a:p>
@@ -2085,7 +2089,7 @@
           <a:p>
             <a:fld id="{429AF907-D2DD-471B-98E0-43B0AA376D69}" type="datetimeFigureOut">
               <a:rPr lang="en-GB" smtClean="0"/>
-              <a:t>13/05/2021</a:t>
+              <a:t>19/05/2021</a:t>
             </a:fld>
             <a:endParaRPr lang="en-GB"/>
           </a:p>
@@ -2398,7 +2402,7 @@
           <a:p>
             <a:fld id="{429AF907-D2DD-471B-98E0-43B0AA376D69}" type="datetimeFigureOut">
               <a:rPr lang="en-GB" smtClean="0"/>
-              <a:t>13/05/2021</a:t>
+              <a:t>19/05/2021</a:t>
             </a:fld>
             <a:endParaRPr lang="en-GB"/>
           </a:p>
@@ -2687,7 +2691,7 @@
           <a:p>
             <a:fld id="{429AF907-D2DD-471B-98E0-43B0AA376D69}" type="datetimeFigureOut">
               <a:rPr lang="en-GB" smtClean="0"/>
-              <a:t>13/05/2021</a:t>
+              <a:t>19/05/2021</a:t>
             </a:fld>
             <a:endParaRPr lang="en-GB"/>
           </a:p>
@@ -2930,7 +2934,7 @@
           <a:p>
             <a:fld id="{429AF907-D2DD-471B-98E0-43B0AA376D69}" type="datetimeFigureOut">
               <a:rPr lang="en-GB" smtClean="0"/>
-              <a:t>13/05/2021</a:t>
+              <a:t>19/05/2021</a:t>
             </a:fld>
             <a:endParaRPr lang="en-GB"/>
           </a:p>
@@ -4531,6 +4535,817 @@
 </p:sld>
 </file>
 
+<file path=ppt/slides/slide2.xml><?xml version="1.0" encoding="utf-8"?>
+<p:sld xmlns:a="http://schemas.openxmlformats.org/drawingml/2006/main" xmlns:r="http://schemas.openxmlformats.org/officeDocument/2006/relationships" xmlns:p="http://schemas.openxmlformats.org/presentationml/2006/main">
+  <p:cSld>
+    <p:spTree>
+      <p:nvGrpSpPr>
+        <p:cNvPr id="1" name=""/>
+        <p:cNvGrpSpPr/>
+        <p:nvPr/>
+      </p:nvGrpSpPr>
+      <p:grpSpPr>
+        <a:xfrm>
+          <a:off x="0" y="0"/>
+          <a:ext cx="0" cy="0"/>
+          <a:chOff x="0" y="0"/>
+          <a:chExt cx="0" cy="0"/>
+        </a:xfrm>
+      </p:grpSpPr>
+      <p:grpSp>
+        <p:nvGrpSpPr>
+          <p:cNvPr id="4" name="Group 3">
+            <a:extLst>
+              <a:ext uri="{FF2B5EF4-FFF2-40B4-BE49-F238E27FC236}">
+                <a16:creationId xmlns:a16="http://schemas.microsoft.com/office/drawing/2014/main" id="{DB13CA08-4621-46F4-92E7-7660243410EC}"/>
+              </a:ext>
+            </a:extLst>
+          </p:cNvPr>
+          <p:cNvGrpSpPr/>
+          <p:nvPr/>
+        </p:nvGrpSpPr>
+        <p:grpSpPr>
+          <a:xfrm>
+            <a:off x="3275773" y="1101285"/>
+            <a:ext cx="5367004" cy="3941818"/>
+            <a:chOff x="3336733" y="613605"/>
+            <a:chExt cx="5367004" cy="3941818"/>
+          </a:xfrm>
+        </p:grpSpPr>
+        <p:pic>
+          <p:nvPicPr>
+            <p:cNvPr id="5" name="Picture 4" descr="A picture containing sitting, cup, table, mug&#10;&#10;Description automatically generated">
+              <a:extLst>
+                <a:ext uri="{FF2B5EF4-FFF2-40B4-BE49-F238E27FC236}">
+                  <a16:creationId xmlns:a16="http://schemas.microsoft.com/office/drawing/2014/main" id="{E93C688D-4482-4DAE-B5EE-40FB46AEFE00}"/>
+                </a:ext>
+              </a:extLst>
+            </p:cNvPr>
+            <p:cNvPicPr>
+              <a:picLocks noChangeAspect="1"/>
+            </p:cNvPicPr>
+            <p:nvPr/>
+          </p:nvPicPr>
+          <p:blipFill>
+            <a:blip r:embed="rId2">
+              <a:extLst>
+                <a:ext uri="{BEBA8EAE-BF5A-486C-A8C5-ECC9F3942E4B}">
+                  <a14:imgProps xmlns:a14="http://schemas.microsoft.com/office/drawing/2010/main">
+                    <a14:imgLayer r:embed="rId3">
+                      <a14:imgEffect>
+                        <a14:colorTemperature colorTemp="11200"/>
+                      </a14:imgEffect>
+                    </a14:imgLayer>
+                  </a14:imgProps>
+                </a:ext>
+              </a:extLst>
+            </a:blip>
+            <a:stretch>
+              <a:fillRect/>
+            </a:stretch>
+          </p:blipFill>
+          <p:spPr>
+            <a:xfrm>
+              <a:off x="7267782" y="2711022"/>
+              <a:ext cx="1435955" cy="1435955"/>
+            </a:xfrm>
+            <a:prstGeom prst="rect">
+              <a:avLst/>
+            </a:prstGeom>
+          </p:spPr>
+        </p:pic>
+        <p:grpSp>
+          <p:nvGrpSpPr>
+            <p:cNvPr id="6" name="Group 5">
+              <a:extLst>
+                <a:ext uri="{FF2B5EF4-FFF2-40B4-BE49-F238E27FC236}">
+                  <a16:creationId xmlns:a16="http://schemas.microsoft.com/office/drawing/2014/main" id="{990A91DC-4365-40CE-940B-BBDF997EC443}"/>
+                </a:ext>
+              </a:extLst>
+            </p:cNvPr>
+            <p:cNvGrpSpPr/>
+            <p:nvPr/>
+          </p:nvGrpSpPr>
+          <p:grpSpPr>
+            <a:xfrm>
+              <a:off x="3336733" y="1973854"/>
+              <a:ext cx="1668149" cy="2173123"/>
+              <a:chOff x="3298633" y="3139915"/>
+              <a:chExt cx="1668149" cy="2173123"/>
+            </a:xfrm>
+          </p:grpSpPr>
+          <p:pic>
+            <p:nvPicPr>
+              <p:cNvPr id="12" name="Picture 11" descr="A picture containing sitting, cup, table, mug&#10;&#10;Description automatically generated">
+                <a:extLst>
+                  <a:ext uri="{FF2B5EF4-FFF2-40B4-BE49-F238E27FC236}">
+                    <a16:creationId xmlns:a16="http://schemas.microsoft.com/office/drawing/2014/main" id="{EB6F4041-B448-4B11-905F-C4EFC1818278}"/>
+                  </a:ext>
+                </a:extLst>
+              </p:cNvPr>
+              <p:cNvPicPr>
+                <a:picLocks noChangeAspect="1"/>
+              </p:cNvPicPr>
+              <p:nvPr/>
+            </p:nvPicPr>
+            <p:blipFill>
+              <a:blip r:embed="rId4"/>
+              <a:stretch>
+                <a:fillRect/>
+              </a:stretch>
+            </p:blipFill>
+            <p:spPr>
+              <a:xfrm>
+                <a:off x="3387516" y="3877083"/>
+                <a:ext cx="1435955" cy="1435955"/>
+              </a:xfrm>
+              <a:prstGeom prst="rect">
+                <a:avLst/>
+              </a:prstGeom>
+            </p:spPr>
+          </p:pic>
+          <p:sp>
+            <p:nvSpPr>
+              <p:cNvPr id="13" name="TextBox 12">
+                <a:extLst>
+                  <a:ext uri="{FF2B5EF4-FFF2-40B4-BE49-F238E27FC236}">
+                    <a16:creationId xmlns:a16="http://schemas.microsoft.com/office/drawing/2014/main" id="{3160A344-00E4-41F9-AB06-B641CE5B082F}"/>
+                  </a:ext>
+                </a:extLst>
+              </p:cNvPr>
+              <p:cNvSpPr txBox="1"/>
+              <p:nvPr/>
+            </p:nvSpPr>
+            <p:spPr>
+              <a:xfrm>
+                <a:off x="3298633" y="3139915"/>
+                <a:ext cx="1668149" cy="738664"/>
+              </a:xfrm>
+              <a:prstGeom prst="rect">
+                <a:avLst/>
+              </a:prstGeom>
+              <a:noFill/>
+            </p:spPr>
+            <p:txBody>
+              <a:bodyPr wrap="none" rtlCol="0">
+                <a:spAutoFit/>
+              </a:bodyPr>
+              <a:lstStyle/>
+              <a:p>
+                <a:pPr algn="ctr"/>
+                <a:r>
+                  <a:rPr lang="en-GB" sz="1400" dirty="0"/>
+                  <a:t>PsychoPy</a:t>
+                </a:r>
+              </a:p>
+              <a:p>
+                <a:pPr algn="ctr"/>
+                <a:r>
+                  <a:rPr lang="en-GB" sz="1400" dirty="0"/>
+                  <a:t>Local set up</a:t>
+                </a:r>
+              </a:p>
+              <a:p>
+                <a:pPr algn="ctr"/>
+                <a:r>
+                  <a:rPr lang="en-GB" sz="1400" dirty="0"/>
+                  <a:t>Experiment creation</a:t>
+                </a:r>
+              </a:p>
+            </p:txBody>
+          </p:sp>
+        </p:grpSp>
+        <p:cxnSp>
+          <p:nvCxnSpPr>
+            <p:cNvPr id="7" name="Straight Arrow Connector 6">
+              <a:extLst>
+                <a:ext uri="{FF2B5EF4-FFF2-40B4-BE49-F238E27FC236}">
+                  <a16:creationId xmlns:a16="http://schemas.microsoft.com/office/drawing/2014/main" id="{436623F3-5E0B-46A2-90CB-681A7E161065}"/>
+                </a:ext>
+              </a:extLst>
+            </p:cNvPr>
+            <p:cNvCxnSpPr>
+              <a:cxnSpLocks/>
+            </p:cNvCxnSpPr>
+            <p:nvPr/>
+          </p:nvCxnSpPr>
+          <p:spPr>
+            <a:xfrm flipH="1" flipV="1">
+              <a:off x="6595266" y="1736004"/>
+              <a:ext cx="974201" cy="1161180"/>
+            </a:xfrm>
+            <a:prstGeom prst="straightConnector1">
+              <a:avLst/>
+            </a:prstGeom>
+            <a:ln w="31750">
+              <a:solidFill>
+                <a:schemeClr val="bg1">
+                  <a:lumMod val="75000"/>
+                </a:schemeClr>
+              </a:solidFill>
+              <a:tailEnd type="triangle" w="lg" len="lg"/>
+            </a:ln>
+          </p:spPr>
+          <p:style>
+            <a:lnRef idx="1">
+              <a:schemeClr val="accent1"/>
+            </a:lnRef>
+            <a:fillRef idx="0">
+              <a:schemeClr val="accent1"/>
+            </a:fillRef>
+            <a:effectRef idx="0">
+              <a:schemeClr val="accent1"/>
+            </a:effectRef>
+            <a:fontRef idx="minor">
+              <a:schemeClr val="tx1"/>
+            </a:fontRef>
+          </p:style>
+        </p:cxnSp>
+        <p:cxnSp>
+          <p:nvCxnSpPr>
+            <p:cNvPr id="8" name="Straight Arrow Connector 7">
+              <a:extLst>
+                <a:ext uri="{FF2B5EF4-FFF2-40B4-BE49-F238E27FC236}">
+                  <a16:creationId xmlns:a16="http://schemas.microsoft.com/office/drawing/2014/main" id="{A8E6D552-6F3F-4315-95F1-0AD38C94BA96}"/>
+                </a:ext>
+              </a:extLst>
+            </p:cNvPr>
+            <p:cNvCxnSpPr>
+              <a:cxnSpLocks/>
+            </p:cNvCxnSpPr>
+            <p:nvPr/>
+          </p:nvCxnSpPr>
+          <p:spPr>
+            <a:xfrm>
+              <a:off x="4812091" y="3372360"/>
+              <a:ext cx="2270276" cy="0"/>
+            </a:xfrm>
+            <a:prstGeom prst="straightConnector1">
+              <a:avLst/>
+            </a:prstGeom>
+            <a:ln w="31750">
+              <a:solidFill>
+                <a:schemeClr val="bg1">
+                  <a:lumMod val="75000"/>
+                </a:schemeClr>
+              </a:solidFill>
+              <a:tailEnd type="triangle" w="lg" len="lg"/>
+            </a:ln>
+          </p:spPr>
+          <p:style>
+            <a:lnRef idx="1">
+              <a:schemeClr val="accent1"/>
+            </a:lnRef>
+            <a:fillRef idx="0">
+              <a:schemeClr val="accent1"/>
+            </a:fillRef>
+            <a:effectRef idx="0">
+              <a:schemeClr val="accent1"/>
+            </a:effectRef>
+            <a:fontRef idx="minor">
+              <a:schemeClr val="tx1"/>
+            </a:fontRef>
+          </p:style>
+        </p:cxnSp>
+        <p:sp>
+          <p:nvSpPr>
+            <p:cNvPr id="9" name="TextBox 8">
+              <a:extLst>
+                <a:ext uri="{FF2B5EF4-FFF2-40B4-BE49-F238E27FC236}">
+                  <a16:creationId xmlns:a16="http://schemas.microsoft.com/office/drawing/2014/main" id="{96B10E6C-65AA-4F38-B735-EB0177498CD9}"/>
+                </a:ext>
+              </a:extLst>
+            </p:cNvPr>
+            <p:cNvSpPr txBox="1"/>
+            <p:nvPr/>
+          </p:nvSpPr>
+          <p:spPr>
+            <a:xfrm>
+              <a:off x="7754882" y="2557133"/>
+              <a:ext cx="825482" cy="307777"/>
+            </a:xfrm>
+            <a:prstGeom prst="rect">
+              <a:avLst/>
+            </a:prstGeom>
+            <a:noFill/>
+          </p:spPr>
+          <p:txBody>
+            <a:bodyPr wrap="none" rtlCol="0">
+              <a:spAutoFit/>
+            </a:bodyPr>
+            <a:lstStyle/>
+            <a:p>
+              <a:r>
+                <a:rPr lang="en-GB" sz="1400" dirty="0"/>
+                <a:t>PsychoJS</a:t>
+              </a:r>
+            </a:p>
+          </p:txBody>
+        </p:sp>
+        <p:pic>
+          <p:nvPicPr>
+            <p:cNvPr id="10" name="Picture 2" descr="Pavlovia">
+              <a:extLst>
+                <a:ext uri="{FF2B5EF4-FFF2-40B4-BE49-F238E27FC236}">
+                  <a16:creationId xmlns:a16="http://schemas.microsoft.com/office/drawing/2014/main" id="{AD42BBC5-674F-4F7F-B86C-1D143FFD2D19}"/>
+                </a:ext>
+              </a:extLst>
+            </p:cNvPr>
+            <p:cNvPicPr>
+              <a:picLocks noChangeAspect="1" noChangeArrowheads="1"/>
+            </p:cNvPicPr>
+            <p:nvPr/>
+          </p:nvPicPr>
+          <p:blipFill>
+            <a:blip r:embed="rId5">
+              <a:extLst>
+                <a:ext uri="{28A0092B-C50C-407E-A947-70E740481C1C}">
+                  <a14:useLocalDpi xmlns:a14="http://schemas.microsoft.com/office/drawing/2010/main" val="0"/>
+                </a:ext>
+              </a:extLst>
+            </a:blip>
+            <a:srcRect/>
+            <a:stretch>
+              <a:fillRect/>
+            </a:stretch>
+          </p:blipFill>
+          <p:spPr bwMode="auto">
+            <a:xfrm>
+              <a:off x="5168084" y="613605"/>
+              <a:ext cx="1558290" cy="1558290"/>
+            </a:xfrm>
+            <a:prstGeom prst="rect">
+              <a:avLst/>
+            </a:prstGeom>
+            <a:noFill/>
+            <a:extLst>
+              <a:ext uri="{909E8E84-426E-40DD-AFC4-6F175D3DCCD1}">
+                <a14:hiddenFill xmlns:a14="http://schemas.microsoft.com/office/drawing/2010/main">
+                  <a:solidFill>
+                    <a:srgbClr val="FFFFFF"/>
+                  </a:solidFill>
+                </a14:hiddenFill>
+              </a:ext>
+            </a:extLst>
+          </p:spPr>
+        </p:pic>
+        <p:sp>
+          <p:nvSpPr>
+            <p:cNvPr id="11" name="TextBox 10">
+              <a:extLst>
+                <a:ext uri="{FF2B5EF4-FFF2-40B4-BE49-F238E27FC236}">
+                  <a16:creationId xmlns:a16="http://schemas.microsoft.com/office/drawing/2014/main" id="{A51F8EE5-673D-4AC1-B6FC-603C16C2F1E6}"/>
+                </a:ext>
+              </a:extLst>
+            </p:cNvPr>
+            <p:cNvSpPr txBox="1"/>
+            <p:nvPr/>
+          </p:nvSpPr>
+          <p:spPr>
+            <a:xfrm>
+              <a:off x="5036114" y="3385872"/>
+              <a:ext cx="2231667" cy="1169551"/>
+            </a:xfrm>
+            <a:prstGeom prst="rect">
+              <a:avLst/>
+            </a:prstGeom>
+            <a:noFill/>
+          </p:spPr>
+          <p:txBody>
+            <a:bodyPr wrap="square" rtlCol="0">
+              <a:spAutoFit/>
+            </a:bodyPr>
+            <a:lstStyle/>
+            <a:p>
+              <a:pPr algn="ctr"/>
+              <a:r>
+                <a:rPr lang="en-GB" sz="1400" dirty="0"/>
+                <a:t>PsychoPy</a:t>
+              </a:r>
+            </a:p>
+            <a:p>
+              <a:pPr algn="ctr"/>
+              <a:r>
+                <a:rPr lang="en-GB" sz="1400" dirty="0"/>
+                <a:t>Writes us a JavaScript version</a:t>
+              </a:r>
+            </a:p>
+            <a:p>
+              <a:pPr algn="ctr"/>
+              <a:r>
+                <a:rPr lang="en-GB" sz="1400" dirty="0"/>
+                <a:t>(we can write from pure JS if you want)</a:t>
+              </a:r>
+            </a:p>
+          </p:txBody>
+        </p:sp>
+      </p:grpSp>
+    </p:spTree>
+    <p:extLst>
+      <p:ext uri="{BB962C8B-B14F-4D97-AF65-F5344CB8AC3E}">
+        <p14:creationId xmlns:p14="http://schemas.microsoft.com/office/powerpoint/2010/main" val="4077230629"/>
+      </p:ext>
+    </p:extLst>
+  </p:cSld>
+  <p:clrMapOvr>
+    <a:masterClrMapping/>
+  </p:clrMapOvr>
+</p:sld>
+</file>
+
+<file path=ppt/slides/slide3.xml><?xml version="1.0" encoding="utf-8"?>
+<p:sld xmlns:a="http://schemas.openxmlformats.org/drawingml/2006/main" xmlns:r="http://schemas.openxmlformats.org/officeDocument/2006/relationships" xmlns:p="http://schemas.openxmlformats.org/presentationml/2006/main">
+  <p:cSld>
+    <p:spTree>
+      <p:nvGrpSpPr>
+        <p:cNvPr id="1" name=""/>
+        <p:cNvGrpSpPr/>
+        <p:nvPr/>
+      </p:nvGrpSpPr>
+      <p:grpSpPr>
+        <a:xfrm>
+          <a:off x="0" y="0"/>
+          <a:ext cx="0" cy="0"/>
+          <a:chOff x="0" y="0"/>
+          <a:chExt cx="0" cy="0"/>
+        </a:xfrm>
+      </p:grpSpPr>
+      <p:grpSp>
+        <p:nvGrpSpPr>
+          <p:cNvPr id="7" name="Group 6">
+            <a:extLst>
+              <a:ext uri="{FF2B5EF4-FFF2-40B4-BE49-F238E27FC236}">
+                <a16:creationId xmlns:a16="http://schemas.microsoft.com/office/drawing/2014/main" id="{2C711A9A-717B-49B6-A60F-1DED528BB702}"/>
+              </a:ext>
+            </a:extLst>
+          </p:cNvPr>
+          <p:cNvGrpSpPr/>
+          <p:nvPr/>
+        </p:nvGrpSpPr>
+        <p:grpSpPr>
+          <a:xfrm>
+            <a:off x="1301503" y="1066678"/>
+            <a:ext cx="9588993" cy="4724643"/>
+            <a:chOff x="1301503" y="1066678"/>
+            <a:chExt cx="9588993" cy="4724643"/>
+          </a:xfrm>
+        </p:grpSpPr>
+        <p:pic>
+          <p:nvPicPr>
+            <p:cNvPr id="4" name="Picture 3">
+              <a:extLst>
+                <a:ext uri="{FF2B5EF4-FFF2-40B4-BE49-F238E27FC236}">
+                  <a16:creationId xmlns:a16="http://schemas.microsoft.com/office/drawing/2014/main" id="{8783D15B-7B27-4E0E-8526-59755439A7DD}"/>
+                </a:ext>
+              </a:extLst>
+            </p:cNvPr>
+            <p:cNvPicPr>
+              <a:picLocks noChangeAspect="1"/>
+            </p:cNvPicPr>
+            <p:nvPr/>
+          </p:nvPicPr>
+          <p:blipFill>
+            <a:blip r:embed="rId2"/>
+            <a:stretch>
+              <a:fillRect/>
+            </a:stretch>
+          </p:blipFill>
+          <p:spPr>
+            <a:xfrm>
+              <a:off x="1301503" y="1066678"/>
+              <a:ext cx="9588993" cy="4724643"/>
+            </a:xfrm>
+            <a:prstGeom prst="rect">
+              <a:avLst/>
+            </a:prstGeom>
+          </p:spPr>
+        </p:pic>
+        <p:cxnSp>
+          <p:nvCxnSpPr>
+            <p:cNvPr id="6" name="Straight Arrow Connector 5">
+              <a:extLst>
+                <a:ext uri="{FF2B5EF4-FFF2-40B4-BE49-F238E27FC236}">
+                  <a16:creationId xmlns:a16="http://schemas.microsoft.com/office/drawing/2014/main" id="{A79C512B-A6AE-482F-AC03-13721F5DF232}"/>
+                </a:ext>
+              </a:extLst>
+            </p:cNvPr>
+            <p:cNvCxnSpPr/>
+            <p:nvPr/>
+          </p:nvCxnSpPr>
+          <p:spPr>
+            <a:xfrm flipV="1">
+              <a:off x="8473440" y="1635760"/>
+              <a:ext cx="548640" cy="853440"/>
+            </a:xfrm>
+            <a:prstGeom prst="straightConnector1">
+              <a:avLst/>
+            </a:prstGeom>
+            <a:ln w="127000">
+              <a:solidFill>
+                <a:srgbClr val="FF0000"/>
+              </a:solidFill>
+              <a:tailEnd type="triangle"/>
+            </a:ln>
+          </p:spPr>
+          <p:style>
+            <a:lnRef idx="1">
+              <a:schemeClr val="accent1"/>
+            </a:lnRef>
+            <a:fillRef idx="0">
+              <a:schemeClr val="accent1"/>
+            </a:fillRef>
+            <a:effectRef idx="0">
+              <a:schemeClr val="accent1"/>
+            </a:effectRef>
+            <a:fontRef idx="minor">
+              <a:schemeClr val="tx1"/>
+            </a:fontRef>
+          </p:style>
+        </p:cxnSp>
+      </p:grpSp>
+    </p:spTree>
+    <p:extLst>
+      <p:ext uri="{BB962C8B-B14F-4D97-AF65-F5344CB8AC3E}">
+        <p14:creationId xmlns:p14="http://schemas.microsoft.com/office/powerpoint/2010/main" val="3321910692"/>
+      </p:ext>
+    </p:extLst>
+  </p:cSld>
+  <p:clrMapOvr>
+    <a:masterClrMapping/>
+  </p:clrMapOvr>
+</p:sld>
+</file>
+
+<file path=ppt/slides/slide4.xml><?xml version="1.0" encoding="utf-8"?>
+<p:sld xmlns:a="http://schemas.openxmlformats.org/drawingml/2006/main" xmlns:r="http://schemas.openxmlformats.org/officeDocument/2006/relationships" xmlns:p="http://schemas.openxmlformats.org/presentationml/2006/main">
+  <p:cSld>
+    <p:bg>
+      <p:bgPr>
+        <a:solidFill>
+          <a:schemeClr val="bg1"/>
+        </a:solidFill>
+        <a:effectLst/>
+      </p:bgPr>
+    </p:bg>
+    <p:spTree>
+      <p:nvGrpSpPr>
+        <p:cNvPr id="1" name=""/>
+        <p:cNvGrpSpPr/>
+        <p:nvPr/>
+      </p:nvGrpSpPr>
+      <p:grpSpPr>
+        <a:xfrm>
+          <a:off x="0" y="0"/>
+          <a:ext cx="0" cy="0"/>
+          <a:chOff x="0" y="0"/>
+          <a:chExt cx="0" cy="0"/>
+        </a:xfrm>
+      </p:grpSpPr>
+      <p:grpSp>
+        <p:nvGrpSpPr>
+          <p:cNvPr id="14" name="Group 13">
+            <a:extLst>
+              <a:ext uri="{FF2B5EF4-FFF2-40B4-BE49-F238E27FC236}">
+                <a16:creationId xmlns:a16="http://schemas.microsoft.com/office/drawing/2014/main" id="{629F3F0F-F628-4787-8C49-68EAC2487D4C}"/>
+              </a:ext>
+            </a:extLst>
+          </p:cNvPr>
+          <p:cNvGrpSpPr/>
+          <p:nvPr/>
+        </p:nvGrpSpPr>
+        <p:grpSpPr>
+          <a:xfrm>
+            <a:off x="3597146" y="1787440"/>
+            <a:ext cx="4997707" cy="3283119"/>
+            <a:chOff x="3597146" y="1787440"/>
+            <a:chExt cx="4997707" cy="3283119"/>
+          </a:xfrm>
+        </p:grpSpPr>
+        <p:pic>
+          <p:nvPicPr>
+            <p:cNvPr id="11" name="Picture 10">
+              <a:extLst>
+                <a:ext uri="{FF2B5EF4-FFF2-40B4-BE49-F238E27FC236}">
+                  <a16:creationId xmlns:a16="http://schemas.microsoft.com/office/drawing/2014/main" id="{50AC54B1-E515-4167-8A42-B485BF63AF06}"/>
+                </a:ext>
+              </a:extLst>
+            </p:cNvPr>
+            <p:cNvPicPr>
+              <a:picLocks noChangeAspect="1"/>
+            </p:cNvPicPr>
+            <p:nvPr/>
+          </p:nvPicPr>
+          <p:blipFill>
+            <a:blip r:embed="rId2">
+              <a:extLst>
+                <a:ext uri="{28A0092B-C50C-407E-A947-70E740481C1C}">
+                  <a14:useLocalDpi xmlns:a14="http://schemas.microsoft.com/office/drawing/2010/main" val="0"/>
+                </a:ext>
+              </a:extLst>
+            </a:blip>
+            <a:stretch>
+              <a:fillRect/>
+            </a:stretch>
+          </p:blipFill>
+          <p:spPr>
+            <a:xfrm>
+              <a:off x="3597146" y="1787440"/>
+              <a:ext cx="4997707" cy="3283119"/>
+            </a:xfrm>
+            <a:prstGeom prst="rect">
+              <a:avLst/>
+            </a:prstGeom>
+          </p:spPr>
+        </p:pic>
+        <p:cxnSp>
+          <p:nvCxnSpPr>
+            <p:cNvPr id="6" name="Straight Arrow Connector 5">
+              <a:extLst>
+                <a:ext uri="{FF2B5EF4-FFF2-40B4-BE49-F238E27FC236}">
+                  <a16:creationId xmlns:a16="http://schemas.microsoft.com/office/drawing/2014/main" id="{A4EAA6D4-B8EE-4213-A942-4B620E2CA9C3}"/>
+                </a:ext>
+              </a:extLst>
+            </p:cNvPr>
+            <p:cNvCxnSpPr>
+              <a:cxnSpLocks/>
+            </p:cNvCxnSpPr>
+            <p:nvPr/>
+          </p:nvCxnSpPr>
+          <p:spPr>
+            <a:xfrm flipH="1">
+              <a:off x="7495224" y="3324543"/>
+              <a:ext cx="885824" cy="857250"/>
+            </a:xfrm>
+            <a:prstGeom prst="straightConnector1">
+              <a:avLst/>
+            </a:prstGeom>
+            <a:ln w="127000">
+              <a:solidFill>
+                <a:srgbClr val="FF0000"/>
+              </a:solidFill>
+              <a:tailEnd type="triangle"/>
+            </a:ln>
+          </p:spPr>
+          <p:style>
+            <a:lnRef idx="1">
+              <a:schemeClr val="accent1"/>
+            </a:lnRef>
+            <a:fillRef idx="0">
+              <a:schemeClr val="accent1"/>
+            </a:fillRef>
+            <a:effectRef idx="0">
+              <a:schemeClr val="accent1"/>
+            </a:effectRef>
+            <a:fontRef idx="minor">
+              <a:schemeClr val="tx1"/>
+            </a:fontRef>
+          </p:style>
+        </p:cxnSp>
+      </p:grpSp>
+    </p:spTree>
+    <p:extLst>
+      <p:ext uri="{BB962C8B-B14F-4D97-AF65-F5344CB8AC3E}">
+        <p14:creationId xmlns:p14="http://schemas.microsoft.com/office/powerpoint/2010/main" val="847104276"/>
+      </p:ext>
+    </p:extLst>
+  </p:cSld>
+  <p:clrMapOvr>
+    <a:masterClrMapping/>
+  </p:clrMapOvr>
+</p:sld>
+</file>
+
+<file path=ppt/slides/slide5.xml><?xml version="1.0" encoding="utf-8"?>
+<p:sld xmlns:a="http://schemas.openxmlformats.org/drawingml/2006/main" xmlns:r="http://schemas.openxmlformats.org/officeDocument/2006/relationships" xmlns:p="http://schemas.openxmlformats.org/presentationml/2006/main">
+  <p:cSld>
+    <p:spTree>
+      <p:nvGrpSpPr>
+        <p:cNvPr id="1" name=""/>
+        <p:cNvGrpSpPr/>
+        <p:nvPr/>
+      </p:nvGrpSpPr>
+      <p:grpSpPr>
+        <a:xfrm>
+          <a:off x="0" y="0"/>
+          <a:ext cx="0" cy="0"/>
+          <a:chOff x="0" y="0"/>
+          <a:chExt cx="0" cy="0"/>
+        </a:xfrm>
+      </p:grpSpPr>
+      <p:grpSp>
+        <p:nvGrpSpPr>
+          <p:cNvPr id="4" name="Group 3">
+            <a:extLst>
+              <a:ext uri="{FF2B5EF4-FFF2-40B4-BE49-F238E27FC236}">
+                <a16:creationId xmlns:a16="http://schemas.microsoft.com/office/drawing/2014/main" id="{5C53EE51-D415-4279-BDD8-D4EF02507419}"/>
+              </a:ext>
+            </a:extLst>
+          </p:cNvPr>
+          <p:cNvGrpSpPr/>
+          <p:nvPr/>
+        </p:nvGrpSpPr>
+        <p:grpSpPr>
+          <a:xfrm>
+            <a:off x="3333608" y="1577880"/>
+            <a:ext cx="5524784" cy="3702240"/>
+            <a:chOff x="3333608" y="1577880"/>
+            <a:chExt cx="5524784" cy="3702240"/>
+          </a:xfrm>
+        </p:grpSpPr>
+        <p:pic>
+          <p:nvPicPr>
+            <p:cNvPr id="3" name="Picture 2">
+              <a:extLst>
+                <a:ext uri="{FF2B5EF4-FFF2-40B4-BE49-F238E27FC236}">
+                  <a16:creationId xmlns:a16="http://schemas.microsoft.com/office/drawing/2014/main" id="{64D2F20E-6586-4B5B-9D12-E7DD38727D61}"/>
+                </a:ext>
+              </a:extLst>
+            </p:cNvPr>
+            <p:cNvPicPr>
+              <a:picLocks noChangeAspect="1"/>
+            </p:cNvPicPr>
+            <p:nvPr/>
+          </p:nvPicPr>
+          <p:blipFill>
+            <a:blip r:embed="rId2">
+              <a:extLst>
+                <a:ext uri="{28A0092B-C50C-407E-A947-70E740481C1C}">
+                  <a14:useLocalDpi xmlns:a14="http://schemas.microsoft.com/office/drawing/2010/main" val="0"/>
+                </a:ext>
+              </a:extLst>
+            </a:blip>
+            <a:stretch>
+              <a:fillRect/>
+            </a:stretch>
+          </p:blipFill>
+          <p:spPr>
+            <a:xfrm>
+              <a:off x="3333608" y="1577880"/>
+              <a:ext cx="5524784" cy="3702240"/>
+            </a:xfrm>
+            <a:prstGeom prst="rect">
+              <a:avLst/>
+            </a:prstGeom>
+          </p:spPr>
+        </p:pic>
+        <p:cxnSp>
+          <p:nvCxnSpPr>
+            <p:cNvPr id="7" name="Straight Arrow Connector 6">
+              <a:extLst>
+                <a:ext uri="{FF2B5EF4-FFF2-40B4-BE49-F238E27FC236}">
+                  <a16:creationId xmlns:a16="http://schemas.microsoft.com/office/drawing/2014/main" id="{C21BE9CA-B5F5-459F-9447-38FE2B0B4799}"/>
+                </a:ext>
+              </a:extLst>
+            </p:cNvPr>
+            <p:cNvCxnSpPr>
+              <a:cxnSpLocks/>
+            </p:cNvCxnSpPr>
+            <p:nvPr/>
+          </p:nvCxnSpPr>
+          <p:spPr>
+            <a:xfrm flipH="1">
+              <a:off x="7200584" y="3151823"/>
+              <a:ext cx="885824" cy="857250"/>
+            </a:xfrm>
+            <a:prstGeom prst="straightConnector1">
+              <a:avLst/>
+            </a:prstGeom>
+            <a:ln w="127000">
+              <a:solidFill>
+                <a:srgbClr val="FF0000"/>
+              </a:solidFill>
+              <a:tailEnd type="triangle"/>
+            </a:ln>
+          </p:spPr>
+          <p:style>
+            <a:lnRef idx="1">
+              <a:schemeClr val="accent1"/>
+            </a:lnRef>
+            <a:fillRef idx="0">
+              <a:schemeClr val="accent1"/>
+            </a:fillRef>
+            <a:effectRef idx="0">
+              <a:schemeClr val="accent1"/>
+            </a:effectRef>
+            <a:fontRef idx="minor">
+              <a:schemeClr val="tx1"/>
+            </a:fontRef>
+          </p:style>
+        </p:cxnSp>
+      </p:grpSp>
+    </p:spTree>
+    <p:extLst>
+      <p:ext uri="{BB962C8B-B14F-4D97-AF65-F5344CB8AC3E}">
+        <p14:creationId xmlns:p14="http://schemas.microsoft.com/office/powerpoint/2010/main" val="3451458491"/>
+      </p:ext>
+    </p:extLst>
+  </p:cSld>
+  <p:clrMapOvr>
+    <a:masterClrMapping/>
+  </p:clrMapOvr>
+</p:sld>
+</file>
+
 <file path=ppt/theme/theme1.xml><?xml version="1.0" encoding="utf-8"?>
 <a:theme xmlns:a="http://schemas.openxmlformats.org/drawingml/2006/main" name="Office Theme">
   <a:themeElements>

</xml_diff>

<commit_message>
update images and headers
</commit_message>
<xml_diff>
--- a/artwork/artwork-editable.pptx
+++ b/artwork/artwork-editable.pptx
@@ -8,10 +8,12 @@
     <p:sldId id="256" r:id="rId2"/>
     <p:sldId id="261" r:id="rId3"/>
     <p:sldId id="262" r:id="rId4"/>
-    <p:sldId id="258" r:id="rId5"/>
-    <p:sldId id="257" r:id="rId6"/>
-    <p:sldId id="259" r:id="rId7"/>
-    <p:sldId id="260" r:id="rId8"/>
+    <p:sldId id="263" r:id="rId5"/>
+    <p:sldId id="264" r:id="rId6"/>
+    <p:sldId id="258" r:id="rId7"/>
+    <p:sldId id="257" r:id="rId8"/>
+    <p:sldId id="259" r:id="rId9"/>
+    <p:sldId id="260" r:id="rId10"/>
   </p:sldIdLst>
   <p:sldSz cx="12192000" cy="6858000"/>
   <p:notesSz cx="6858000" cy="9144000"/>
@@ -4918,6 +4920,540 @@
       </p:grpSpPr>
       <p:grpSp>
         <p:nvGrpSpPr>
+          <p:cNvPr id="10" name="Group 9">
+            <a:extLst>
+              <a:ext uri="{FF2B5EF4-FFF2-40B4-BE49-F238E27FC236}">
+                <a16:creationId xmlns:a16="http://schemas.microsoft.com/office/drawing/2014/main" id="{4C12FE65-1A34-4154-836F-1F5C12F4EE56}"/>
+              </a:ext>
+            </a:extLst>
+          </p:cNvPr>
+          <p:cNvGrpSpPr/>
+          <p:nvPr/>
+        </p:nvGrpSpPr>
+        <p:grpSpPr>
+          <a:xfrm>
+            <a:off x="1484851" y="1528097"/>
+            <a:ext cx="9735127" cy="3801806"/>
+            <a:chOff x="0" y="1528097"/>
+            <a:chExt cx="9735127" cy="3801806"/>
+          </a:xfrm>
+        </p:grpSpPr>
+        <p:pic>
+          <p:nvPicPr>
+            <p:cNvPr id="5" name="Picture 4" descr="Graphical user interface, table&#10;&#10;Description automatically generated">
+              <a:extLst>
+                <a:ext uri="{FF2B5EF4-FFF2-40B4-BE49-F238E27FC236}">
+                  <a16:creationId xmlns:a16="http://schemas.microsoft.com/office/drawing/2014/main" id="{22A0CA48-F5E6-4F17-982E-641E68C18559}"/>
+                </a:ext>
+              </a:extLst>
+            </p:cNvPr>
+            <p:cNvPicPr>
+              <a:picLocks noChangeAspect="1"/>
+            </p:cNvPicPr>
+            <p:nvPr/>
+          </p:nvPicPr>
+          <p:blipFill rotWithShape="1">
+            <a:blip r:embed="rId2">
+              <a:extLst>
+                <a:ext uri="{28A0092B-C50C-407E-A947-70E740481C1C}">
+                  <a14:useLocalDpi xmlns:a14="http://schemas.microsoft.com/office/drawing/2010/main" val="0"/>
+                </a:ext>
+              </a:extLst>
+            </a:blip>
+            <a:srcRect r="20152"/>
+            <a:stretch/>
+          </p:blipFill>
+          <p:spPr>
+            <a:xfrm>
+              <a:off x="0" y="1528097"/>
+              <a:ext cx="9735127" cy="3801806"/>
+            </a:xfrm>
+            <a:prstGeom prst="rect">
+              <a:avLst/>
+            </a:prstGeom>
+          </p:spPr>
+        </p:pic>
+        <p:cxnSp>
+          <p:nvCxnSpPr>
+            <p:cNvPr id="6" name="Straight Arrow Connector 5">
+              <a:extLst>
+                <a:ext uri="{FF2B5EF4-FFF2-40B4-BE49-F238E27FC236}">
+                  <a16:creationId xmlns:a16="http://schemas.microsoft.com/office/drawing/2014/main" id="{AD94228C-0CAB-4865-9195-67696B7A927B}"/>
+                </a:ext>
+              </a:extLst>
+            </p:cNvPr>
+            <p:cNvCxnSpPr>
+              <a:cxnSpLocks/>
+            </p:cNvCxnSpPr>
+            <p:nvPr/>
+          </p:nvCxnSpPr>
+          <p:spPr>
+            <a:xfrm flipH="1" flipV="1">
+              <a:off x="3944795" y="1813272"/>
+              <a:ext cx="1209096" cy="671311"/>
+            </a:xfrm>
+            <a:prstGeom prst="straightConnector1">
+              <a:avLst/>
+            </a:prstGeom>
+            <a:ln w="127000">
+              <a:solidFill>
+                <a:srgbClr val="FF0000"/>
+              </a:solidFill>
+              <a:tailEnd type="triangle"/>
+            </a:ln>
+          </p:spPr>
+          <p:style>
+            <a:lnRef idx="1">
+              <a:schemeClr val="accent1"/>
+            </a:lnRef>
+            <a:fillRef idx="0">
+              <a:schemeClr val="accent1"/>
+            </a:fillRef>
+            <a:effectRef idx="0">
+              <a:schemeClr val="accent1"/>
+            </a:effectRef>
+            <a:fontRef idx="minor">
+              <a:schemeClr val="tx1"/>
+            </a:fontRef>
+          </p:style>
+        </p:cxnSp>
+        <p:cxnSp>
+          <p:nvCxnSpPr>
+            <p:cNvPr id="9" name="Straight Arrow Connector 8">
+              <a:extLst>
+                <a:ext uri="{FF2B5EF4-FFF2-40B4-BE49-F238E27FC236}">
+                  <a16:creationId xmlns:a16="http://schemas.microsoft.com/office/drawing/2014/main" id="{07CBAFEA-2A0C-4017-B5F0-030CCA99B06E}"/>
+                </a:ext>
+              </a:extLst>
+            </p:cNvPr>
+            <p:cNvCxnSpPr>
+              <a:cxnSpLocks/>
+            </p:cNvCxnSpPr>
+            <p:nvPr/>
+          </p:nvCxnSpPr>
+          <p:spPr>
+            <a:xfrm flipH="1" flipV="1">
+              <a:off x="2028249" y="2484583"/>
+              <a:ext cx="1209096" cy="671311"/>
+            </a:xfrm>
+            <a:prstGeom prst="straightConnector1">
+              <a:avLst/>
+            </a:prstGeom>
+            <a:ln w="127000">
+              <a:solidFill>
+                <a:srgbClr val="FF0000"/>
+              </a:solidFill>
+              <a:tailEnd type="triangle"/>
+            </a:ln>
+          </p:spPr>
+          <p:style>
+            <a:lnRef idx="1">
+              <a:schemeClr val="accent1"/>
+            </a:lnRef>
+            <a:fillRef idx="0">
+              <a:schemeClr val="accent1"/>
+            </a:fillRef>
+            <a:effectRef idx="0">
+              <a:schemeClr val="accent1"/>
+            </a:effectRef>
+            <a:fontRef idx="minor">
+              <a:schemeClr val="tx1"/>
+            </a:fontRef>
+          </p:style>
+        </p:cxnSp>
+      </p:grpSp>
+    </p:spTree>
+    <p:extLst>
+      <p:ext uri="{BB962C8B-B14F-4D97-AF65-F5344CB8AC3E}">
+        <p14:creationId xmlns:p14="http://schemas.microsoft.com/office/powerpoint/2010/main" val="2001028618"/>
+      </p:ext>
+    </p:extLst>
+  </p:cSld>
+  <p:clrMapOvr>
+    <a:masterClrMapping/>
+  </p:clrMapOvr>
+</p:sld>
+</file>
+
+<file path=ppt/slides/slide5.xml><?xml version="1.0" encoding="utf-8"?>
+<p:sld xmlns:a="http://schemas.openxmlformats.org/drawingml/2006/main" xmlns:r="http://schemas.openxmlformats.org/officeDocument/2006/relationships" xmlns:p="http://schemas.openxmlformats.org/presentationml/2006/main">
+  <p:cSld>
+    <p:spTree>
+      <p:nvGrpSpPr>
+        <p:cNvPr id="1" name=""/>
+        <p:cNvGrpSpPr/>
+        <p:nvPr/>
+      </p:nvGrpSpPr>
+      <p:grpSpPr>
+        <a:xfrm>
+          <a:off x="0" y="0"/>
+          <a:ext cx="0" cy="0"/>
+          <a:chOff x="0" y="0"/>
+          <a:chExt cx="0" cy="0"/>
+        </a:xfrm>
+      </p:grpSpPr>
+      <p:grpSp>
+        <p:nvGrpSpPr>
+          <p:cNvPr id="14" name="Group 13">
+            <a:extLst>
+              <a:ext uri="{FF2B5EF4-FFF2-40B4-BE49-F238E27FC236}">
+                <a16:creationId xmlns:a16="http://schemas.microsoft.com/office/drawing/2014/main" id="{42054CDA-6EB5-41B9-ACA8-9B36CC627153}"/>
+              </a:ext>
+            </a:extLst>
+          </p:cNvPr>
+          <p:cNvGrpSpPr/>
+          <p:nvPr/>
+        </p:nvGrpSpPr>
+        <p:grpSpPr>
+          <a:xfrm>
+            <a:off x="1910172" y="1829370"/>
+            <a:ext cx="8611802" cy="3949907"/>
+            <a:chOff x="1910172" y="1829370"/>
+            <a:chExt cx="8611802" cy="3949907"/>
+          </a:xfrm>
+        </p:grpSpPr>
+        <p:pic>
+          <p:nvPicPr>
+            <p:cNvPr id="5" name="Picture 4" descr="Graphical user interface, text, application&#10;&#10;Description automatically generated">
+              <a:extLst>
+                <a:ext uri="{FF2B5EF4-FFF2-40B4-BE49-F238E27FC236}">
+                  <a16:creationId xmlns:a16="http://schemas.microsoft.com/office/drawing/2014/main" id="{35F6DC74-26EB-45D4-A8B5-254679BE7D16}"/>
+                </a:ext>
+              </a:extLst>
+            </p:cNvPr>
+            <p:cNvPicPr>
+              <a:picLocks noChangeAspect="1"/>
+            </p:cNvPicPr>
+            <p:nvPr/>
+          </p:nvPicPr>
+          <p:blipFill>
+            <a:blip r:embed="rId2">
+              <a:extLst>
+                <a:ext uri="{28A0092B-C50C-407E-A947-70E740481C1C}">
+                  <a14:useLocalDpi xmlns:a14="http://schemas.microsoft.com/office/drawing/2010/main" val="0"/>
+                </a:ext>
+              </a:extLst>
+            </a:blip>
+            <a:stretch>
+              <a:fillRect/>
+            </a:stretch>
+          </p:blipFill>
+          <p:spPr>
+            <a:xfrm>
+              <a:off x="1910172" y="1829370"/>
+              <a:ext cx="8611802" cy="2524477"/>
+            </a:xfrm>
+            <a:prstGeom prst="rect">
+              <a:avLst/>
+            </a:prstGeom>
+          </p:spPr>
+        </p:pic>
+        <p:cxnSp>
+          <p:nvCxnSpPr>
+            <p:cNvPr id="6" name="Straight Arrow Connector 5">
+              <a:extLst>
+                <a:ext uri="{FF2B5EF4-FFF2-40B4-BE49-F238E27FC236}">
+                  <a16:creationId xmlns:a16="http://schemas.microsoft.com/office/drawing/2014/main" id="{07B361E9-5104-428F-B602-85DC7C3B21CA}"/>
+                </a:ext>
+              </a:extLst>
+            </p:cNvPr>
+            <p:cNvCxnSpPr>
+              <a:cxnSpLocks/>
+            </p:cNvCxnSpPr>
+            <p:nvPr/>
+          </p:nvCxnSpPr>
+          <p:spPr>
+            <a:xfrm flipV="1">
+              <a:off x="6253018" y="3567967"/>
+              <a:ext cx="0" cy="785880"/>
+            </a:xfrm>
+            <a:prstGeom prst="straightConnector1">
+              <a:avLst/>
+            </a:prstGeom>
+            <a:ln w="127000">
+              <a:solidFill>
+                <a:srgbClr val="FF0000"/>
+              </a:solidFill>
+              <a:tailEnd type="triangle"/>
+            </a:ln>
+          </p:spPr>
+          <p:style>
+            <a:lnRef idx="1">
+              <a:schemeClr val="accent1"/>
+            </a:lnRef>
+            <a:fillRef idx="0">
+              <a:schemeClr val="accent1"/>
+            </a:fillRef>
+            <a:effectRef idx="0">
+              <a:schemeClr val="accent1"/>
+            </a:effectRef>
+            <a:fontRef idx="minor">
+              <a:schemeClr val="tx1"/>
+            </a:fontRef>
+          </p:style>
+        </p:cxnSp>
+        <p:sp>
+          <p:nvSpPr>
+            <p:cNvPr id="8" name="TextBox 7">
+              <a:extLst>
+                <a:ext uri="{FF2B5EF4-FFF2-40B4-BE49-F238E27FC236}">
+                  <a16:creationId xmlns:a16="http://schemas.microsoft.com/office/drawing/2014/main" id="{470EE3FE-BDC9-44A3-B39F-0B808505E4B8}"/>
+                </a:ext>
+              </a:extLst>
+            </p:cNvPr>
+            <p:cNvSpPr txBox="1"/>
+            <p:nvPr/>
+          </p:nvSpPr>
+          <p:spPr>
+            <a:xfrm>
+              <a:off x="5029594" y="4301949"/>
+              <a:ext cx="2775375" cy="1477328"/>
+            </a:xfrm>
+            <a:prstGeom prst="rect">
+              <a:avLst/>
+            </a:prstGeom>
+            <a:noFill/>
+          </p:spPr>
+          <p:txBody>
+            <a:bodyPr wrap="none" rtlCol="0">
+              <a:spAutoFit/>
+            </a:bodyPr>
+            <a:lstStyle/>
+            <a:p>
+              <a:r>
+                <a:rPr lang="en-US" dirty="0"/>
+                <a:t>Generates a pilot token</a:t>
+              </a:r>
+            </a:p>
+            <a:p>
+              <a:r>
+                <a:rPr lang="en-US" dirty="0"/>
+                <a:t>Lasts 1 hour</a:t>
+              </a:r>
+            </a:p>
+            <a:p>
+              <a:r>
+                <a:rPr lang="en-US" dirty="0"/>
+                <a:t>No credits used</a:t>
+              </a:r>
+            </a:p>
+            <a:p>
+              <a:r>
+                <a:rPr lang="en-US" dirty="0"/>
+                <a:t>No data saved to repository</a:t>
+              </a:r>
+            </a:p>
+            <a:p>
+              <a:r>
+                <a:rPr lang="en-US" dirty="0"/>
+                <a:t>Local data file downloaded</a:t>
+              </a:r>
+            </a:p>
+          </p:txBody>
+        </p:sp>
+        <p:cxnSp>
+          <p:nvCxnSpPr>
+            <p:cNvPr id="10" name="Straight Arrow Connector 9">
+              <a:extLst>
+                <a:ext uri="{FF2B5EF4-FFF2-40B4-BE49-F238E27FC236}">
+                  <a16:creationId xmlns:a16="http://schemas.microsoft.com/office/drawing/2014/main" id="{66C24796-3580-4420-B6B4-AFB4B9CD5D75}"/>
+                </a:ext>
+              </a:extLst>
+            </p:cNvPr>
+            <p:cNvCxnSpPr>
+              <a:cxnSpLocks/>
+            </p:cNvCxnSpPr>
+            <p:nvPr/>
+          </p:nvCxnSpPr>
+          <p:spPr>
+            <a:xfrm flipV="1">
+              <a:off x="9132295" y="3619865"/>
+              <a:ext cx="0" cy="785880"/>
+            </a:xfrm>
+            <a:prstGeom prst="straightConnector1">
+              <a:avLst/>
+            </a:prstGeom>
+            <a:ln w="127000">
+              <a:solidFill>
+                <a:srgbClr val="FF0000"/>
+              </a:solidFill>
+              <a:tailEnd type="triangle"/>
+            </a:ln>
+          </p:spPr>
+          <p:style>
+            <a:lnRef idx="1">
+              <a:schemeClr val="accent1"/>
+            </a:lnRef>
+            <a:fillRef idx="0">
+              <a:schemeClr val="accent1"/>
+            </a:fillRef>
+            <a:effectRef idx="0">
+              <a:schemeClr val="accent1"/>
+            </a:effectRef>
+            <a:fontRef idx="minor">
+              <a:schemeClr val="tx1"/>
+            </a:fontRef>
+          </p:style>
+        </p:cxnSp>
+        <p:sp>
+          <p:nvSpPr>
+            <p:cNvPr id="11" name="TextBox 10">
+              <a:extLst>
+                <a:ext uri="{FF2B5EF4-FFF2-40B4-BE49-F238E27FC236}">
+                  <a16:creationId xmlns:a16="http://schemas.microsoft.com/office/drawing/2014/main" id="{FDE3D648-3306-4D7F-9AC8-5097884ED2ED}"/>
+                </a:ext>
+              </a:extLst>
+            </p:cNvPr>
+            <p:cNvSpPr txBox="1"/>
+            <p:nvPr/>
+          </p:nvSpPr>
+          <p:spPr>
+            <a:xfrm>
+              <a:off x="7908871" y="4353847"/>
+              <a:ext cx="2525307" cy="923330"/>
+            </a:xfrm>
+            <a:prstGeom prst="rect">
+              <a:avLst/>
+            </a:prstGeom>
+            <a:noFill/>
+          </p:spPr>
+          <p:txBody>
+            <a:bodyPr wrap="none" rtlCol="0">
+              <a:spAutoFit/>
+            </a:bodyPr>
+            <a:lstStyle/>
+            <a:p>
+              <a:r>
+                <a:rPr lang="en-US" dirty="0"/>
+                <a:t>Generates sharable URL</a:t>
+              </a:r>
+            </a:p>
+            <a:p>
+              <a:r>
+                <a:rPr lang="en-US" dirty="0"/>
+                <a:t>Credit/license needed</a:t>
+              </a:r>
+            </a:p>
+            <a:p>
+              <a:r>
+                <a:rPr lang="en-US" dirty="0"/>
+                <a:t>Data saved to repository </a:t>
+              </a:r>
+            </a:p>
+          </p:txBody>
+        </p:sp>
+        <p:cxnSp>
+          <p:nvCxnSpPr>
+            <p:cNvPr id="12" name="Straight Arrow Connector 11">
+              <a:extLst>
+                <a:ext uri="{FF2B5EF4-FFF2-40B4-BE49-F238E27FC236}">
+                  <a16:creationId xmlns:a16="http://schemas.microsoft.com/office/drawing/2014/main" id="{ACE1526B-1745-49D8-8064-FB179B694BD8}"/>
+                </a:ext>
+              </a:extLst>
+            </p:cNvPr>
+            <p:cNvCxnSpPr>
+              <a:cxnSpLocks/>
+            </p:cNvCxnSpPr>
+            <p:nvPr/>
+          </p:nvCxnSpPr>
+          <p:spPr>
+            <a:xfrm flipV="1">
+              <a:off x="3305620" y="3601391"/>
+              <a:ext cx="0" cy="785880"/>
+            </a:xfrm>
+            <a:prstGeom prst="straightConnector1">
+              <a:avLst/>
+            </a:prstGeom>
+            <a:ln w="127000">
+              <a:solidFill>
+                <a:srgbClr val="FF0000"/>
+              </a:solidFill>
+              <a:tailEnd type="triangle"/>
+            </a:ln>
+          </p:spPr>
+          <p:style>
+            <a:lnRef idx="1">
+              <a:schemeClr val="accent1"/>
+            </a:lnRef>
+            <a:fillRef idx="0">
+              <a:schemeClr val="accent1"/>
+            </a:fillRef>
+            <a:effectRef idx="0">
+              <a:schemeClr val="accent1"/>
+            </a:effectRef>
+            <a:fontRef idx="minor">
+              <a:schemeClr val="tx1"/>
+            </a:fontRef>
+          </p:style>
+        </p:cxnSp>
+        <p:sp>
+          <p:nvSpPr>
+            <p:cNvPr id="13" name="TextBox 12">
+              <a:extLst>
+                <a:ext uri="{FF2B5EF4-FFF2-40B4-BE49-F238E27FC236}">
+                  <a16:creationId xmlns:a16="http://schemas.microsoft.com/office/drawing/2014/main" id="{9E2C5827-5095-4F3C-8259-F19194C0B7CC}"/>
+                </a:ext>
+              </a:extLst>
+            </p:cNvPr>
+            <p:cNvSpPr txBox="1"/>
+            <p:nvPr/>
+          </p:nvSpPr>
+          <p:spPr>
+            <a:xfrm>
+              <a:off x="2082197" y="4335373"/>
+              <a:ext cx="2618872" cy="1200329"/>
+            </a:xfrm>
+            <a:prstGeom prst="rect">
+              <a:avLst/>
+            </a:prstGeom>
+            <a:noFill/>
+          </p:spPr>
+          <p:txBody>
+            <a:bodyPr wrap="square" rtlCol="0">
+              <a:spAutoFit/>
+            </a:bodyPr>
+            <a:lstStyle/>
+            <a:p>
+              <a:r>
+                <a:rPr lang="en-US" dirty="0"/>
+                <a:t>Useful for sharing your task (if public) whilst not allowing users to add data to your own repository.</a:t>
+              </a:r>
+            </a:p>
+          </p:txBody>
+        </p:sp>
+      </p:grpSp>
+    </p:spTree>
+    <p:extLst>
+      <p:ext uri="{BB962C8B-B14F-4D97-AF65-F5344CB8AC3E}">
+        <p14:creationId xmlns:p14="http://schemas.microsoft.com/office/powerpoint/2010/main" val="1731463855"/>
+      </p:ext>
+    </p:extLst>
+  </p:cSld>
+  <p:clrMapOvr>
+    <a:masterClrMapping/>
+  </p:clrMapOvr>
+</p:sld>
+</file>
+
+<file path=ppt/slides/slide6.xml><?xml version="1.0" encoding="utf-8"?>
+<p:sld xmlns:a="http://schemas.openxmlformats.org/drawingml/2006/main" xmlns:r="http://schemas.openxmlformats.org/officeDocument/2006/relationships" xmlns:p="http://schemas.openxmlformats.org/presentationml/2006/main">
+  <p:cSld>
+    <p:spTree>
+      <p:nvGrpSpPr>
+        <p:cNvPr id="1" name=""/>
+        <p:cNvGrpSpPr/>
+        <p:nvPr/>
+      </p:nvGrpSpPr>
+      <p:grpSpPr>
+        <a:xfrm>
+          <a:off x="0" y="0"/>
+          <a:ext cx="0" cy="0"/>
+          <a:chOff x="0" y="0"/>
+          <a:chExt cx="0" cy="0"/>
+        </a:xfrm>
+      </p:grpSpPr>
+      <p:grpSp>
+        <p:nvGrpSpPr>
           <p:cNvPr id="4" name="Group 3">
             <a:extLst>
               <a:ext uri="{FF2B5EF4-FFF2-40B4-BE49-F238E27FC236}">
@@ -5317,7 +5853,7 @@
 </p:sld>
 </file>
 
-<file path=ppt/slides/slide5.xml><?xml version="1.0" encoding="utf-8"?>
+<file path=ppt/slides/slide7.xml><?xml version="1.0" encoding="utf-8"?>
 <p:sld xmlns:a="http://schemas.openxmlformats.org/drawingml/2006/main" xmlns:r="http://schemas.openxmlformats.org/officeDocument/2006/relationships" xmlns:p="http://schemas.openxmlformats.org/presentationml/2006/main">
   <p:cSld>
     <p:spTree>
@@ -5440,7 +5976,7 @@
 </p:sld>
 </file>
 
-<file path=ppt/slides/slide6.xml><?xml version="1.0" encoding="utf-8"?>
+<file path=ppt/slides/slide8.xml><?xml version="1.0" encoding="utf-8"?>
 <p:sld xmlns:a="http://schemas.openxmlformats.org/drawingml/2006/main" xmlns:r="http://schemas.openxmlformats.org/officeDocument/2006/relationships" xmlns:p="http://schemas.openxmlformats.org/presentationml/2006/main">
   <p:cSld>
     <p:bg>
@@ -5579,7 +6115,7 @@
 </p:sld>
 </file>
 
-<file path=ppt/slides/slide7.xml><?xml version="1.0" encoding="utf-8"?>
+<file path=ppt/slides/slide9.xml><?xml version="1.0" encoding="utf-8"?>
 <p:sld xmlns:a="http://schemas.openxmlformats.org/drawingml/2006/main" xmlns:r="http://schemas.openxmlformats.org/officeDocument/2006/relationships" xmlns:p="http://schemas.openxmlformats.org/presentationml/2006/main">
   <p:cSld>
     <p:spTree>

</xml_diff>

<commit_message>
update 3hr landing page
</commit_message>
<xml_diff>
--- a/artwork/artwork-editable.pptx
+++ b/artwork/artwork-editable.pptx
@@ -6,16 +6,17 @@
   </p:sldMasterIdLst>
   <p:sldIdLst>
     <p:sldId id="256" r:id="rId2"/>
-    <p:sldId id="261" r:id="rId3"/>
-    <p:sldId id="262" r:id="rId4"/>
-    <p:sldId id="263" r:id="rId5"/>
-    <p:sldId id="264" r:id="rId6"/>
-    <p:sldId id="265" r:id="rId7"/>
-    <p:sldId id="266" r:id="rId8"/>
-    <p:sldId id="258" r:id="rId9"/>
-    <p:sldId id="257" r:id="rId10"/>
-    <p:sldId id="259" r:id="rId11"/>
-    <p:sldId id="260" r:id="rId12"/>
+    <p:sldId id="267" r:id="rId3"/>
+    <p:sldId id="261" r:id="rId4"/>
+    <p:sldId id="262" r:id="rId5"/>
+    <p:sldId id="263" r:id="rId6"/>
+    <p:sldId id="264" r:id="rId7"/>
+    <p:sldId id="265" r:id="rId8"/>
+    <p:sldId id="266" r:id="rId9"/>
+    <p:sldId id="258" r:id="rId10"/>
+    <p:sldId id="257" r:id="rId11"/>
+    <p:sldId id="259" r:id="rId12"/>
+    <p:sldId id="260" r:id="rId13"/>
   </p:sldIdLst>
   <p:sldSz cx="12192000" cy="6858000"/>
   <p:notesSz cx="6858000" cy="9144000"/>
@@ -271,7 +272,7 @@
           <a:p>
             <a:fld id="{429AF907-D2DD-471B-98E0-43B0AA376D69}" type="datetimeFigureOut">
               <a:rPr lang="en-GB" smtClean="0"/>
-              <a:t>20/05/2021</a:t>
+              <a:t>11/06/2021</a:t>
             </a:fld>
             <a:endParaRPr lang="en-GB"/>
           </a:p>
@@ -471,7 +472,7 @@
           <a:p>
             <a:fld id="{429AF907-D2DD-471B-98E0-43B0AA376D69}" type="datetimeFigureOut">
               <a:rPr lang="en-GB" smtClean="0"/>
-              <a:t>20/05/2021</a:t>
+              <a:t>11/06/2021</a:t>
             </a:fld>
             <a:endParaRPr lang="en-GB"/>
           </a:p>
@@ -681,7 +682,7 @@
           <a:p>
             <a:fld id="{429AF907-D2DD-471B-98E0-43B0AA376D69}" type="datetimeFigureOut">
               <a:rPr lang="en-GB" smtClean="0"/>
-              <a:t>20/05/2021</a:t>
+              <a:t>11/06/2021</a:t>
             </a:fld>
             <a:endParaRPr lang="en-GB"/>
           </a:p>
@@ -881,7 +882,7 @@
           <a:p>
             <a:fld id="{429AF907-D2DD-471B-98E0-43B0AA376D69}" type="datetimeFigureOut">
               <a:rPr lang="en-GB" smtClean="0"/>
-              <a:t>20/05/2021</a:t>
+              <a:t>11/06/2021</a:t>
             </a:fld>
             <a:endParaRPr lang="en-GB"/>
           </a:p>
@@ -1157,7 +1158,7 @@
           <a:p>
             <a:fld id="{429AF907-D2DD-471B-98E0-43B0AA376D69}" type="datetimeFigureOut">
               <a:rPr lang="en-GB" smtClean="0"/>
-              <a:t>20/05/2021</a:t>
+              <a:t>11/06/2021</a:t>
             </a:fld>
             <a:endParaRPr lang="en-GB"/>
           </a:p>
@@ -1425,7 +1426,7 @@
           <a:p>
             <a:fld id="{429AF907-D2DD-471B-98E0-43B0AA376D69}" type="datetimeFigureOut">
               <a:rPr lang="en-GB" smtClean="0"/>
-              <a:t>20/05/2021</a:t>
+              <a:t>11/06/2021</a:t>
             </a:fld>
             <a:endParaRPr lang="en-GB"/>
           </a:p>
@@ -1840,7 +1841,7 @@
           <a:p>
             <a:fld id="{429AF907-D2DD-471B-98E0-43B0AA376D69}" type="datetimeFigureOut">
               <a:rPr lang="en-GB" smtClean="0"/>
-              <a:t>20/05/2021</a:t>
+              <a:t>11/06/2021</a:t>
             </a:fld>
             <a:endParaRPr lang="en-GB"/>
           </a:p>
@@ -1982,7 +1983,7 @@
           <a:p>
             <a:fld id="{429AF907-D2DD-471B-98E0-43B0AA376D69}" type="datetimeFigureOut">
               <a:rPr lang="en-GB" smtClean="0"/>
-              <a:t>20/05/2021</a:t>
+              <a:t>11/06/2021</a:t>
             </a:fld>
             <a:endParaRPr lang="en-GB"/>
           </a:p>
@@ -2095,7 +2096,7 @@
           <a:p>
             <a:fld id="{429AF907-D2DD-471B-98E0-43B0AA376D69}" type="datetimeFigureOut">
               <a:rPr lang="en-GB" smtClean="0"/>
-              <a:t>20/05/2021</a:t>
+              <a:t>11/06/2021</a:t>
             </a:fld>
             <a:endParaRPr lang="en-GB"/>
           </a:p>
@@ -2408,7 +2409,7 @@
           <a:p>
             <a:fld id="{429AF907-D2DD-471B-98E0-43B0AA376D69}" type="datetimeFigureOut">
               <a:rPr lang="en-GB" smtClean="0"/>
-              <a:t>20/05/2021</a:t>
+              <a:t>11/06/2021</a:t>
             </a:fld>
             <a:endParaRPr lang="en-GB"/>
           </a:p>
@@ -2697,7 +2698,7 @@
           <a:p>
             <a:fld id="{429AF907-D2DD-471B-98E0-43B0AA376D69}" type="datetimeFigureOut">
               <a:rPr lang="en-GB" smtClean="0"/>
-              <a:t>20/05/2021</a:t>
+              <a:t>11/06/2021</a:t>
             </a:fld>
             <a:endParaRPr lang="en-GB"/>
           </a:p>
@@ -2940,7 +2941,7 @@
           <a:p>
             <a:fld id="{429AF907-D2DD-471B-98E0-43B0AA376D69}" type="datetimeFigureOut">
               <a:rPr lang="en-GB" smtClean="0"/>
-              <a:t>20/05/2021</a:t>
+              <a:t>11/06/2021</a:t>
             </a:fld>
             <a:endParaRPr lang="en-GB"/>
           </a:p>
@@ -4544,6 +4545,129 @@
 <file path=ppt/slides/slide10.xml><?xml version="1.0" encoding="utf-8"?>
 <p:sld xmlns:a="http://schemas.openxmlformats.org/drawingml/2006/main" xmlns:r="http://schemas.openxmlformats.org/officeDocument/2006/relationships" xmlns:p="http://schemas.openxmlformats.org/presentationml/2006/main">
   <p:cSld>
+    <p:spTree>
+      <p:nvGrpSpPr>
+        <p:cNvPr id="1" name=""/>
+        <p:cNvGrpSpPr/>
+        <p:nvPr/>
+      </p:nvGrpSpPr>
+      <p:grpSpPr>
+        <a:xfrm>
+          <a:off x="0" y="0"/>
+          <a:ext cx="0" cy="0"/>
+          <a:chOff x="0" y="0"/>
+          <a:chExt cx="0" cy="0"/>
+        </a:xfrm>
+      </p:grpSpPr>
+      <p:grpSp>
+        <p:nvGrpSpPr>
+          <p:cNvPr id="7" name="Group 6">
+            <a:extLst>
+              <a:ext uri="{FF2B5EF4-FFF2-40B4-BE49-F238E27FC236}">
+                <a16:creationId xmlns:a16="http://schemas.microsoft.com/office/drawing/2014/main" id="{2C711A9A-717B-49B6-A60F-1DED528BB702}"/>
+              </a:ext>
+            </a:extLst>
+          </p:cNvPr>
+          <p:cNvGrpSpPr/>
+          <p:nvPr/>
+        </p:nvGrpSpPr>
+        <p:grpSpPr>
+          <a:xfrm>
+            <a:off x="1301503" y="1066678"/>
+            <a:ext cx="9588993" cy="4724643"/>
+            <a:chOff x="1301503" y="1066678"/>
+            <a:chExt cx="9588993" cy="4724643"/>
+          </a:xfrm>
+        </p:grpSpPr>
+        <p:pic>
+          <p:nvPicPr>
+            <p:cNvPr id="4" name="Picture 3">
+              <a:extLst>
+                <a:ext uri="{FF2B5EF4-FFF2-40B4-BE49-F238E27FC236}">
+                  <a16:creationId xmlns:a16="http://schemas.microsoft.com/office/drawing/2014/main" id="{8783D15B-7B27-4E0E-8526-59755439A7DD}"/>
+                </a:ext>
+              </a:extLst>
+            </p:cNvPr>
+            <p:cNvPicPr>
+              <a:picLocks noChangeAspect="1"/>
+            </p:cNvPicPr>
+            <p:nvPr/>
+          </p:nvPicPr>
+          <p:blipFill>
+            <a:blip r:embed="rId2"/>
+            <a:stretch>
+              <a:fillRect/>
+            </a:stretch>
+          </p:blipFill>
+          <p:spPr>
+            <a:xfrm>
+              <a:off x="1301503" y="1066678"/>
+              <a:ext cx="9588993" cy="4724643"/>
+            </a:xfrm>
+            <a:prstGeom prst="rect">
+              <a:avLst/>
+            </a:prstGeom>
+          </p:spPr>
+        </p:pic>
+        <p:cxnSp>
+          <p:nvCxnSpPr>
+            <p:cNvPr id="6" name="Straight Arrow Connector 5">
+              <a:extLst>
+                <a:ext uri="{FF2B5EF4-FFF2-40B4-BE49-F238E27FC236}">
+                  <a16:creationId xmlns:a16="http://schemas.microsoft.com/office/drawing/2014/main" id="{A79C512B-A6AE-482F-AC03-13721F5DF232}"/>
+                </a:ext>
+              </a:extLst>
+            </p:cNvPr>
+            <p:cNvCxnSpPr/>
+            <p:nvPr/>
+          </p:nvCxnSpPr>
+          <p:spPr>
+            <a:xfrm flipV="1">
+              <a:off x="8473440" y="1635760"/>
+              <a:ext cx="548640" cy="853440"/>
+            </a:xfrm>
+            <a:prstGeom prst="straightConnector1">
+              <a:avLst/>
+            </a:prstGeom>
+            <a:ln w="127000">
+              <a:solidFill>
+                <a:srgbClr val="FF0000"/>
+              </a:solidFill>
+              <a:tailEnd type="triangle"/>
+            </a:ln>
+          </p:spPr>
+          <p:style>
+            <a:lnRef idx="1">
+              <a:schemeClr val="accent1"/>
+            </a:lnRef>
+            <a:fillRef idx="0">
+              <a:schemeClr val="accent1"/>
+            </a:fillRef>
+            <a:effectRef idx="0">
+              <a:schemeClr val="accent1"/>
+            </a:effectRef>
+            <a:fontRef idx="minor">
+              <a:schemeClr val="tx1"/>
+            </a:fontRef>
+          </p:style>
+        </p:cxnSp>
+      </p:grpSp>
+    </p:spTree>
+    <p:extLst>
+      <p:ext uri="{BB962C8B-B14F-4D97-AF65-F5344CB8AC3E}">
+        <p14:creationId xmlns:p14="http://schemas.microsoft.com/office/powerpoint/2010/main" val="3321910692"/>
+      </p:ext>
+    </p:extLst>
+  </p:cSld>
+  <p:clrMapOvr>
+    <a:masterClrMapping/>
+  </p:clrMapOvr>
+</p:sld>
+</file>
+
+<file path=ppt/slides/slide11.xml><?xml version="1.0" encoding="utf-8"?>
+<p:sld xmlns:a="http://schemas.openxmlformats.org/drawingml/2006/main" xmlns:r="http://schemas.openxmlformats.org/officeDocument/2006/relationships" xmlns:p="http://schemas.openxmlformats.org/presentationml/2006/main">
+  <p:cSld>
     <p:bg>
       <p:bgPr>
         <a:solidFill>
@@ -4680,7 +4804,7 @@
 </p:sld>
 </file>
 
-<file path=ppt/slides/slide11.xml><?xml version="1.0" encoding="utf-8"?>
+<file path=ppt/slides/slide12.xml><?xml version="1.0" encoding="utf-8"?>
 <p:sld xmlns:a="http://schemas.openxmlformats.org/drawingml/2006/main" xmlns:r="http://schemas.openxmlformats.org/officeDocument/2006/relationships" xmlns:p="http://schemas.openxmlformats.org/presentationml/2006/main">
   <p:cSld>
     <p:spTree>
@@ -4828,6 +4952,305 @@
           <a:chExt cx="0" cy="0"/>
         </a:xfrm>
       </p:grpSpPr>
+      <p:graphicFrame>
+        <p:nvGraphicFramePr>
+          <p:cNvPr id="4" name="Table 4">
+            <a:extLst>
+              <a:ext uri="{FF2B5EF4-FFF2-40B4-BE49-F238E27FC236}">
+                <a16:creationId xmlns:a16="http://schemas.microsoft.com/office/drawing/2014/main" id="{2F405742-144E-489B-903D-E708A88E0D20}"/>
+              </a:ext>
+            </a:extLst>
+          </p:cNvPr>
+          <p:cNvGraphicFramePr>
+            <a:graphicFrameLocks noGrp="1"/>
+          </p:cNvGraphicFramePr>
+          <p:nvPr>
+            <p:extLst>
+              <p:ext uri="{D42A27DB-BD31-4B8C-83A1-F6EECF244321}">
+                <p14:modId xmlns:p14="http://schemas.microsoft.com/office/powerpoint/2010/main" val="357030661"/>
+              </p:ext>
+            </p:extLst>
+          </p:nvPr>
+        </p:nvGraphicFramePr>
+        <p:xfrm>
+          <a:off x="1249960" y="1828458"/>
+          <a:ext cx="8999709" cy="1960609"/>
+        </p:xfrm>
+        <a:graphic>
+          <a:graphicData uri="http://schemas.openxmlformats.org/drawingml/2006/table">
+            <a:tbl>
+              <a:tblPr firstRow="1" bandRow="1">
+                <a:tableStyleId>{5C22544A-7EE6-4342-B048-85BDC9FD1C3A}</a:tableStyleId>
+              </a:tblPr>
+              <a:tblGrid>
+                <a:gridCol w="2999903">
+                  <a:extLst>
+                    <a:ext uri="{9D8B030D-6E8A-4147-A177-3AD203B41FA5}">
+                      <a16:colId xmlns:a16="http://schemas.microsoft.com/office/drawing/2014/main" val="3758745780"/>
+                    </a:ext>
+                  </a:extLst>
+                </a:gridCol>
+                <a:gridCol w="2999903">
+                  <a:extLst>
+                    <a:ext uri="{9D8B030D-6E8A-4147-A177-3AD203B41FA5}">
+                      <a16:colId xmlns:a16="http://schemas.microsoft.com/office/drawing/2014/main" val="1963517404"/>
+                    </a:ext>
+                  </a:extLst>
+                </a:gridCol>
+                <a:gridCol w="2999903">
+                  <a:extLst>
+                    <a:ext uri="{9D8B030D-6E8A-4147-A177-3AD203B41FA5}">
+                      <a16:colId xmlns:a16="http://schemas.microsoft.com/office/drawing/2014/main" val="4258317285"/>
+                    </a:ext>
+                  </a:extLst>
+                </a:gridCol>
+              </a:tblGrid>
+              <a:tr h="423890">
+                <a:tc>
+                  <a:txBody>
+                    <a:bodyPr/>
+                    <a:lstStyle/>
+                    <a:p>
+                      <a:r>
+                        <a:rPr lang="en-US" dirty="0">
+                          <a:solidFill>
+                            <a:schemeClr val="tx1"/>
+                          </a:solidFill>
+                          <a:latin typeface="Arvo" panose="02000000000000000000" pitchFamily="2" charset="0"/>
+                        </a:rPr>
+                        <a:t>Hour 1</a:t>
+                      </a:r>
+                      <a:endParaRPr lang="en-GB" dirty="0">
+                        <a:solidFill>
+                          <a:schemeClr val="tx1"/>
+                        </a:solidFill>
+                        <a:latin typeface="Arvo" panose="02000000000000000000" pitchFamily="2" charset="0"/>
+                      </a:endParaRPr>
+                    </a:p>
+                  </a:txBody>
+                  <a:tcPr>
+                    <a:solidFill>
+                      <a:srgbClr val="EB692A"/>
+                    </a:solidFill>
+                  </a:tcPr>
+                </a:tc>
+                <a:tc>
+                  <a:txBody>
+                    <a:bodyPr/>
+                    <a:lstStyle/>
+                    <a:p>
+                      <a:r>
+                        <a:rPr lang="en-US" dirty="0">
+                          <a:solidFill>
+                            <a:schemeClr val="tx1"/>
+                          </a:solidFill>
+                          <a:latin typeface="Arvo" panose="02000000000000000000" pitchFamily="2" charset="0"/>
+                        </a:rPr>
+                        <a:t>Hour 2</a:t>
+                      </a:r>
+                      <a:endParaRPr lang="en-GB" dirty="0">
+                        <a:solidFill>
+                          <a:schemeClr val="tx1"/>
+                        </a:solidFill>
+                        <a:latin typeface="Arvo" panose="02000000000000000000" pitchFamily="2" charset="0"/>
+                      </a:endParaRPr>
+                    </a:p>
+                  </a:txBody>
+                  <a:tcPr>
+                    <a:solidFill>
+                      <a:srgbClr val="26DCF0"/>
+                    </a:solidFill>
+                  </a:tcPr>
+                </a:tc>
+                <a:tc>
+                  <a:txBody>
+                    <a:bodyPr/>
+                    <a:lstStyle/>
+                    <a:p>
+                      <a:r>
+                        <a:rPr lang="en-US" dirty="0">
+                          <a:solidFill>
+                            <a:schemeClr val="tx1"/>
+                          </a:solidFill>
+                          <a:latin typeface="Arvo" panose="02000000000000000000" pitchFamily="2" charset="0"/>
+                        </a:rPr>
+                        <a:t>Hour 3</a:t>
+                      </a:r>
+                      <a:endParaRPr lang="en-GB" dirty="0">
+                        <a:solidFill>
+                          <a:schemeClr val="tx1"/>
+                        </a:solidFill>
+                        <a:latin typeface="Arvo" panose="02000000000000000000" pitchFamily="2" charset="0"/>
+                      </a:endParaRPr>
+                    </a:p>
+                  </a:txBody>
+                  <a:tcPr>
+                    <a:solidFill>
+                      <a:srgbClr val="F7F11C"/>
+                    </a:solidFill>
+                  </a:tcPr>
+                </a:tc>
+                <a:extLst>
+                  <a:ext uri="{0D108BD9-81ED-4DB2-BD59-A6C34878D82A}">
+                    <a16:rowId xmlns:a16="http://schemas.microsoft.com/office/drawing/2014/main" val="2197648278"/>
+                  </a:ext>
+                </a:extLst>
+              </a:tr>
+              <a:tr h="1536719">
+                <a:tc>
+                  <a:txBody>
+                    <a:bodyPr/>
+                    <a:lstStyle/>
+                    <a:p>
+                      <a:pPr marL="285750" indent="-285750">
+                        <a:buFont typeface="Arial" panose="020B0604020202020204" pitchFamily="34" charset="0"/>
+                        <a:buChar char="•"/>
+                      </a:pPr>
+                      <a:r>
+                        <a:rPr lang="en-US" dirty="0">
+                          <a:latin typeface="Arvo" panose="02000000000000000000" pitchFamily="2" charset="0"/>
+                        </a:rPr>
+                        <a:t>Building an experiment in </a:t>
+                      </a:r>
+                      <a:r>
+                        <a:rPr lang="en-US" dirty="0" err="1">
+                          <a:latin typeface="Arvo" panose="02000000000000000000" pitchFamily="2" charset="0"/>
+                        </a:rPr>
+                        <a:t>PsychoPy</a:t>
+                      </a:r>
+                      <a:endParaRPr lang="en-GB" dirty="0">
+                        <a:latin typeface="Arvo" panose="02000000000000000000" pitchFamily="2" charset="0"/>
+                      </a:endParaRPr>
+                    </a:p>
+                  </a:txBody>
+                  <a:tcPr>
+                    <a:solidFill>
+                      <a:schemeClr val="accent2">
+                        <a:lumMod val="40000"/>
+                        <a:lumOff val="60000"/>
+                      </a:schemeClr>
+                    </a:solidFill>
+                  </a:tcPr>
+                </a:tc>
+                <a:tc>
+                  <a:txBody>
+                    <a:bodyPr/>
+                    <a:lstStyle/>
+                    <a:p>
+                      <a:pPr marL="285750" indent="-285750">
+                        <a:buFont typeface="Arial" panose="020B0604020202020204" pitchFamily="34" charset="0"/>
+                        <a:buChar char="•"/>
+                      </a:pPr>
+                      <a:r>
+                        <a:rPr lang="en-US" dirty="0">
+                          <a:latin typeface="Arvo" panose="02000000000000000000" pitchFamily="2" charset="0"/>
+                        </a:rPr>
+                        <a:t>Launching your study online</a:t>
+                      </a:r>
+                    </a:p>
+                    <a:p>
+                      <a:pPr marL="285750" indent="-285750">
+                        <a:buFont typeface="Arial" panose="020B0604020202020204" pitchFamily="34" charset="0"/>
+                        <a:buChar char="•"/>
+                      </a:pPr>
+                      <a:endParaRPr lang="en-US" dirty="0">
+                        <a:latin typeface="Arvo" panose="02000000000000000000" pitchFamily="2" charset="0"/>
+                      </a:endParaRPr>
+                    </a:p>
+                    <a:p>
+                      <a:pPr marL="285750" indent="-285750">
+                        <a:buFont typeface="Arial" panose="020B0604020202020204" pitchFamily="34" charset="0"/>
+                        <a:buChar char="•"/>
+                      </a:pPr>
+                      <a:r>
+                        <a:rPr lang="en-US" dirty="0">
+                          <a:latin typeface="Arvo" panose="02000000000000000000" pitchFamily="2" charset="0"/>
+                        </a:rPr>
+                        <a:t>Counterbalancing</a:t>
+                      </a:r>
+                      <a:endParaRPr lang="en-GB" dirty="0">
+                        <a:latin typeface="Arvo" panose="02000000000000000000" pitchFamily="2" charset="0"/>
+                      </a:endParaRPr>
+                    </a:p>
+                  </a:txBody>
+                  <a:tcPr>
+                    <a:solidFill>
+                      <a:srgbClr val="91EDF7"/>
+                    </a:solidFill>
+                  </a:tcPr>
+                </a:tc>
+                <a:tc>
+                  <a:txBody>
+                    <a:bodyPr/>
+                    <a:lstStyle/>
+                    <a:p>
+                      <a:pPr marL="285750" indent="-285750">
+                        <a:buFont typeface="Arial" panose="020B0604020202020204" pitchFamily="34" charset="0"/>
+                        <a:buChar char="•"/>
+                      </a:pPr>
+                      <a:r>
+                        <a:rPr lang="en-US">
+                          <a:latin typeface="Arvo" panose="02000000000000000000" pitchFamily="2" charset="0"/>
+                        </a:rPr>
+                        <a:t>Making </a:t>
+                      </a:r>
+                      <a:r>
+                        <a:rPr lang="en-US" dirty="0">
+                          <a:latin typeface="Arvo" panose="02000000000000000000" pitchFamily="2" charset="0"/>
+                        </a:rPr>
+                        <a:t>things dynamic</a:t>
+                      </a:r>
+                      <a:endParaRPr lang="en-GB" dirty="0">
+                        <a:latin typeface="Arvo" panose="02000000000000000000" pitchFamily="2" charset="0"/>
+                      </a:endParaRPr>
+                    </a:p>
+                  </a:txBody>
+                  <a:tcPr>
+                    <a:solidFill>
+                      <a:srgbClr val="FCFAA6"/>
+                    </a:solidFill>
+                  </a:tcPr>
+                </a:tc>
+                <a:extLst>
+                  <a:ext uri="{0D108BD9-81ED-4DB2-BD59-A6C34878D82A}">
+                    <a16:rowId xmlns:a16="http://schemas.microsoft.com/office/drawing/2014/main" val="2528514078"/>
+                  </a:ext>
+                </a:extLst>
+              </a:tr>
+            </a:tbl>
+          </a:graphicData>
+        </a:graphic>
+      </p:graphicFrame>
+    </p:spTree>
+    <p:extLst>
+      <p:ext uri="{BB962C8B-B14F-4D97-AF65-F5344CB8AC3E}">
+        <p14:creationId xmlns:p14="http://schemas.microsoft.com/office/powerpoint/2010/main" val="1048829939"/>
+      </p:ext>
+    </p:extLst>
+  </p:cSld>
+  <p:clrMapOvr>
+    <a:masterClrMapping/>
+  </p:clrMapOvr>
+</p:sld>
+</file>
+
+<file path=ppt/slides/slide3.xml><?xml version="1.0" encoding="utf-8"?>
+<p:sld xmlns:a="http://schemas.openxmlformats.org/drawingml/2006/main" xmlns:r="http://schemas.openxmlformats.org/officeDocument/2006/relationships" xmlns:p="http://schemas.openxmlformats.org/presentationml/2006/main">
+  <p:cSld>
+    <p:spTree>
+      <p:nvGrpSpPr>
+        <p:cNvPr id="1" name=""/>
+        <p:cNvGrpSpPr/>
+        <p:nvPr/>
+      </p:nvGrpSpPr>
+      <p:grpSpPr>
+        <a:xfrm>
+          <a:off x="0" y="0"/>
+          <a:ext cx="0" cy="0"/>
+          <a:chOff x="0" y="0"/>
+          <a:chExt cx="0" cy="0"/>
+        </a:xfrm>
+      </p:grpSpPr>
       <p:grpSp>
         <p:nvGrpSpPr>
           <p:cNvPr id="7" name="Group 6">
@@ -4942,7 +5365,7 @@
 </p:sld>
 </file>
 
-<file path=ppt/slides/slide3.xml><?xml version="1.0" encoding="utf-8"?>
+<file path=ppt/slides/slide4.xml><?xml version="1.0" encoding="utf-8"?>
 <p:sld xmlns:a="http://schemas.openxmlformats.org/drawingml/2006/main" xmlns:r="http://schemas.openxmlformats.org/officeDocument/2006/relationships" xmlns:p="http://schemas.openxmlformats.org/presentationml/2006/main">
   <p:cSld>
     <p:spTree>
@@ -5173,7 +5596,7 @@
 </p:sld>
 </file>
 
-<file path=ppt/slides/slide4.xml><?xml version="1.0" encoding="utf-8"?>
+<file path=ppt/slides/slide5.xml><?xml version="1.0" encoding="utf-8"?>
 <p:sld xmlns:a="http://schemas.openxmlformats.org/drawingml/2006/main" xmlns:r="http://schemas.openxmlformats.org/officeDocument/2006/relationships" xmlns:p="http://schemas.openxmlformats.org/presentationml/2006/main">
   <p:cSld>
     <p:spTree>
@@ -5347,7 +5770,7 @@
 </p:sld>
 </file>
 
-<file path=ppt/slides/slide5.xml><?xml version="1.0" encoding="utf-8"?>
+<file path=ppt/slides/slide6.xml><?xml version="1.0" encoding="utf-8"?>
 <p:sld xmlns:a="http://schemas.openxmlformats.org/drawingml/2006/main" xmlns:r="http://schemas.openxmlformats.org/officeDocument/2006/relationships" xmlns:p="http://schemas.openxmlformats.org/presentationml/2006/main">
   <p:cSld>
     <p:spTree>
@@ -5707,7 +6130,7 @@
 </p:sld>
 </file>
 
-<file path=ppt/slides/slide6.xml><?xml version="1.0" encoding="utf-8"?>
+<file path=ppt/slides/slide7.xml><?xml version="1.0" encoding="utf-8"?>
 <p:sld xmlns:a="http://schemas.openxmlformats.org/drawingml/2006/main" xmlns:r="http://schemas.openxmlformats.org/officeDocument/2006/relationships" xmlns:p="http://schemas.openxmlformats.org/presentationml/2006/main">
   <p:cSld>
     <p:spTree>
@@ -5926,7 +6349,7 @@
 </p:sld>
 </file>
 
-<file path=ppt/slides/slide7.xml><?xml version="1.0" encoding="utf-8"?>
+<file path=ppt/slides/slide8.xml><?xml version="1.0" encoding="utf-8"?>
 <p:sld xmlns:a="http://schemas.openxmlformats.org/drawingml/2006/main" xmlns:r="http://schemas.openxmlformats.org/officeDocument/2006/relationships" xmlns:p="http://schemas.openxmlformats.org/presentationml/2006/main">
   <p:cSld>
     <p:spTree>
@@ -6145,7 +6568,7 @@
 </p:sld>
 </file>
 
-<file path=ppt/slides/slide8.xml><?xml version="1.0" encoding="utf-8"?>
+<file path=ppt/slides/slide9.xml><?xml version="1.0" encoding="utf-8"?>
 <p:sld xmlns:a="http://schemas.openxmlformats.org/drawingml/2006/main" xmlns:r="http://schemas.openxmlformats.org/officeDocument/2006/relationships" xmlns:p="http://schemas.openxmlformats.org/presentationml/2006/main">
   <p:cSld>
     <p:spTree>
@@ -6563,129 +6986,6 @@
 </p:sld>
 </file>
 
-<file path=ppt/slides/slide9.xml><?xml version="1.0" encoding="utf-8"?>
-<p:sld xmlns:a="http://schemas.openxmlformats.org/drawingml/2006/main" xmlns:r="http://schemas.openxmlformats.org/officeDocument/2006/relationships" xmlns:p="http://schemas.openxmlformats.org/presentationml/2006/main">
-  <p:cSld>
-    <p:spTree>
-      <p:nvGrpSpPr>
-        <p:cNvPr id="1" name=""/>
-        <p:cNvGrpSpPr/>
-        <p:nvPr/>
-      </p:nvGrpSpPr>
-      <p:grpSpPr>
-        <a:xfrm>
-          <a:off x="0" y="0"/>
-          <a:ext cx="0" cy="0"/>
-          <a:chOff x="0" y="0"/>
-          <a:chExt cx="0" cy="0"/>
-        </a:xfrm>
-      </p:grpSpPr>
-      <p:grpSp>
-        <p:nvGrpSpPr>
-          <p:cNvPr id="7" name="Group 6">
-            <a:extLst>
-              <a:ext uri="{FF2B5EF4-FFF2-40B4-BE49-F238E27FC236}">
-                <a16:creationId xmlns:a16="http://schemas.microsoft.com/office/drawing/2014/main" id="{2C711A9A-717B-49B6-A60F-1DED528BB702}"/>
-              </a:ext>
-            </a:extLst>
-          </p:cNvPr>
-          <p:cNvGrpSpPr/>
-          <p:nvPr/>
-        </p:nvGrpSpPr>
-        <p:grpSpPr>
-          <a:xfrm>
-            <a:off x="1301503" y="1066678"/>
-            <a:ext cx="9588993" cy="4724643"/>
-            <a:chOff x="1301503" y="1066678"/>
-            <a:chExt cx="9588993" cy="4724643"/>
-          </a:xfrm>
-        </p:grpSpPr>
-        <p:pic>
-          <p:nvPicPr>
-            <p:cNvPr id="4" name="Picture 3">
-              <a:extLst>
-                <a:ext uri="{FF2B5EF4-FFF2-40B4-BE49-F238E27FC236}">
-                  <a16:creationId xmlns:a16="http://schemas.microsoft.com/office/drawing/2014/main" id="{8783D15B-7B27-4E0E-8526-59755439A7DD}"/>
-                </a:ext>
-              </a:extLst>
-            </p:cNvPr>
-            <p:cNvPicPr>
-              <a:picLocks noChangeAspect="1"/>
-            </p:cNvPicPr>
-            <p:nvPr/>
-          </p:nvPicPr>
-          <p:blipFill>
-            <a:blip r:embed="rId2"/>
-            <a:stretch>
-              <a:fillRect/>
-            </a:stretch>
-          </p:blipFill>
-          <p:spPr>
-            <a:xfrm>
-              <a:off x="1301503" y="1066678"/>
-              <a:ext cx="9588993" cy="4724643"/>
-            </a:xfrm>
-            <a:prstGeom prst="rect">
-              <a:avLst/>
-            </a:prstGeom>
-          </p:spPr>
-        </p:pic>
-        <p:cxnSp>
-          <p:nvCxnSpPr>
-            <p:cNvPr id="6" name="Straight Arrow Connector 5">
-              <a:extLst>
-                <a:ext uri="{FF2B5EF4-FFF2-40B4-BE49-F238E27FC236}">
-                  <a16:creationId xmlns:a16="http://schemas.microsoft.com/office/drawing/2014/main" id="{A79C512B-A6AE-482F-AC03-13721F5DF232}"/>
-                </a:ext>
-              </a:extLst>
-            </p:cNvPr>
-            <p:cNvCxnSpPr/>
-            <p:nvPr/>
-          </p:nvCxnSpPr>
-          <p:spPr>
-            <a:xfrm flipV="1">
-              <a:off x="8473440" y="1635760"/>
-              <a:ext cx="548640" cy="853440"/>
-            </a:xfrm>
-            <a:prstGeom prst="straightConnector1">
-              <a:avLst/>
-            </a:prstGeom>
-            <a:ln w="127000">
-              <a:solidFill>
-                <a:srgbClr val="FF0000"/>
-              </a:solidFill>
-              <a:tailEnd type="triangle"/>
-            </a:ln>
-          </p:spPr>
-          <p:style>
-            <a:lnRef idx="1">
-              <a:schemeClr val="accent1"/>
-            </a:lnRef>
-            <a:fillRef idx="0">
-              <a:schemeClr val="accent1"/>
-            </a:fillRef>
-            <a:effectRef idx="0">
-              <a:schemeClr val="accent1"/>
-            </a:effectRef>
-            <a:fontRef idx="minor">
-              <a:schemeClr val="tx1"/>
-            </a:fontRef>
-          </p:style>
-        </p:cxnSp>
-      </p:grpSp>
-    </p:spTree>
-    <p:extLst>
-      <p:ext uri="{BB962C8B-B14F-4D97-AF65-F5344CB8AC3E}">
-        <p14:creationId xmlns:p14="http://schemas.microsoft.com/office/powerpoint/2010/main" val="3321910692"/>
-      </p:ext>
-    </p:extLst>
-  </p:cSld>
-  <p:clrMapOvr>
-    <a:masterClrMapping/>
-  </p:clrMapOvr>
-</p:sld>
-</file>
-
 <file path=ppt/theme/theme1.xml><?xml version="1.0" encoding="utf-8"?>
 <a:theme xmlns:a="http://schemas.openxmlformats.org/drawingml/2006/main" name="Office Theme">
   <a:themeElements>

</xml_diff>